<commit_message>
Ignite presentation and mindmap
</commit_message>
<xml_diff>
--- a/doc/Ignite.pptx
+++ b/doc/Ignite.pptx
@@ -3175,6 +3175,73 @@
           </a:prstGeom>
         </p:spPr>
       </p:pic>
+      <p:sp>
+        <p:nvSpPr>
+          <p:cNvPr id="5" name="TextBox 4"/>
+          <p:cNvSpPr txBox="1"/>
+          <p:nvPr/>
+        </p:nvSpPr>
+        <p:spPr>
+          <a:xfrm>
+            <a:off x="497417" y="949847"/>
+            <a:ext cx="8106833" cy="523220"/>
+          </a:xfrm>
+          <a:prstGeom prst="rect">
+            <a:avLst/>
+          </a:prstGeom>
+          <a:noFill/>
+        </p:spPr>
+        <p:txBody>
+          <a:bodyPr wrap="square" rtlCol="0">
+            <a:spAutoFit/>
+          </a:bodyPr>
+          <a:lstStyle/>
+          <a:p>
+            <a:r>
+              <a:rPr lang="en-US" sz="2800" dirty="0" smtClean="0">
+                <a:solidFill>
+                  <a:schemeClr val="tx1">
+                    <a:lumMod val="50000"/>
+                    <a:lumOff val="50000"/>
+                  </a:schemeClr>
+                </a:solidFill>
+              </a:rPr>
+              <a:t>https://</a:t>
+            </a:r>
+            <a:r>
+              <a:rPr lang="en-US" sz="2800" dirty="0" err="1" smtClean="0">
+                <a:solidFill>
+                  <a:schemeClr val="tx1">
+                    <a:lumMod val="50000"/>
+                    <a:lumOff val="50000"/>
+                  </a:schemeClr>
+                </a:solidFill>
+              </a:rPr>
+              <a:t>github.com</a:t>
+            </a:r>
+            <a:r>
+              <a:rPr lang="en-US" sz="2800" dirty="0" smtClean="0">
+                <a:solidFill>
+                  <a:schemeClr val="tx1">
+                    <a:lumMod val="50000"/>
+                    <a:lumOff val="50000"/>
+                  </a:schemeClr>
+                </a:solidFill>
+              </a:rPr>
+              <a:t>/</a:t>
+            </a:r>
+            <a:r>
+              <a:rPr lang="en-US" sz="2800" dirty="0" err="1" smtClean="0"/>
+              <a:t>ckorakidis</a:t>
+            </a:r>
+            <a:r>
+              <a:rPr lang="en-US" sz="2800" dirty="0" smtClean="0"/>
+              <a:t>/ignite/tree/master/doc</a:t>
+            </a:r>
+            <a:endParaRPr lang="en-US" sz="2800" dirty="0"/>
+          </a:p>
+        </p:txBody>
+      </p:sp>
     </p:spTree>
     <p:extLst>
       <p:ext uri="{BB962C8B-B14F-4D97-AF65-F5344CB8AC3E}">

</xml_diff>